<commit_message>
Mid-day update day 2
</commit_message>
<xml_diff>
--- a/learning_outcomes.pptx
+++ b/learning_outcomes.pptx
@@ -12350,7 +12350,9 @@
         </p:nvSpPr>
         <p:spPr/>
         <p:txBody>
-          <a:bodyPr/>
+          <a:bodyPr>
+            <a:normAutofit fontScale="92500" lnSpcReduction="20000"/>
+          </a:bodyPr>
           <a:lstStyle/>
           <a:p>
             <a:r>
@@ -12372,6 +12374,12 @@
             <a:r>
               <a:rPr lang="en-US"/>
               <a:t>sorbonne center for artificial intelligence (SCAI)</a:t>
+            </a:r>
+          </a:p>
+          <a:p>
+            <a:r>
+              <a:rPr lang="en-US"/>
+              <a:t>james.gawley@gmail.com</a:t>
             </a:r>
           </a:p>
         </p:txBody>
@@ -12447,7 +12455,7 @@
           <a:p>
             <a:r>
               <a:rPr lang="en-US"/>
-              <a:t>Install python</a:t>
+              <a:t>Install python, jupyter notebooks, git</a:t>
             </a:r>
           </a:p>
           <a:p>

</xml_diff>